<commit_message>
[Add] paper references -- #2
</commit_message>
<xml_diff>
--- a/Documentation/Study of posibilities.pptx
+++ b/Documentation/Study of posibilities.pptx
@@ -5,10 +5,10 @@
     <p:sldMasterId id="2147483672" r:id="rId4"/>
   </p:sldMasterIdLst>
   <p:notesMasterIdLst>
-    <p:notesMasterId r:id="rId15"/>
+    <p:notesMasterId r:id="rId20"/>
   </p:notesMasterIdLst>
   <p:handoutMasterIdLst>
-    <p:handoutMasterId r:id="rId16"/>
+    <p:handoutMasterId r:id="rId21"/>
   </p:handoutMasterIdLst>
   <p:sldIdLst>
     <p:sldId id="256" r:id="rId5"/>
@@ -17,10 +17,15 @@
     <p:sldId id="264" r:id="rId8"/>
     <p:sldId id="273" r:id="rId9"/>
     <p:sldId id="274" r:id="rId10"/>
-    <p:sldId id="275" r:id="rId11"/>
-    <p:sldId id="267" r:id="rId12"/>
-    <p:sldId id="276" r:id="rId13"/>
-    <p:sldId id="277" r:id="rId14"/>
+    <p:sldId id="280" r:id="rId11"/>
+    <p:sldId id="278" r:id="rId12"/>
+    <p:sldId id="281" r:id="rId13"/>
+    <p:sldId id="282" r:id="rId14"/>
+    <p:sldId id="279" r:id="rId15"/>
+    <p:sldId id="275" r:id="rId16"/>
+    <p:sldId id="267" r:id="rId17"/>
+    <p:sldId id="276" r:id="rId18"/>
+    <p:sldId id="277" r:id="rId19"/>
   </p:sldIdLst>
   <p:sldSz cx="12192000" cy="6858000"/>
   <p:notesSz cx="6858000" cy="9144000"/>
@@ -226,7 +231,7 @@
             <a:pPr rtl="0"/>
             <a:fld id="{BAF1E655-8005-439B-A707-E0DFC1D589DB}" type="datetime1">
               <a:rPr lang="fr-FR" smtClean="0"/>
-              <a:t>07/10/2021</a:t>
+              <a:t>08/10/2021</a:t>
             </a:fld>
             <a:endParaRPr lang="fr-FR"/>
           </a:p>
@@ -408,7 +413,7 @@
             <a:pPr rtl="0"/>
             <a:fld id="{A17E75E7-B22D-43B4-8F53-B0241C6C4C44}" type="datetime1">
               <a:rPr lang="fr-FR" noProof="0" smtClean="0"/>
-              <a:t>07/10/2021</a:t>
+              <a:t>08/10/2021</a:t>
             </a:fld>
             <a:endParaRPr lang="fr-FR" noProof="0"/>
           </a:p>
@@ -878,7 +883,120 @@
             <a:pPr rtl="0"/>
             <a:fld id="{E6AEB063-7F11-4E3B-BA52-07405B1C2D95}" type="slidenum">
               <a:rPr lang="fr-FR" smtClean="0"/>
-              <a:t>10</a:t>
+              <a:t>14</a:t>
+            </a:fld>
+            <a:endParaRPr lang="fr-FR"/>
+          </a:p>
+        </p:txBody>
+      </p:sp>
+    </p:spTree>
+    <p:extLst>
+      <p:ext uri="{BB962C8B-B14F-4D97-AF65-F5344CB8AC3E}">
+        <p14:creationId xmlns:p14="http://schemas.microsoft.com/office/powerpoint/2010/main" val="1317945858"/>
+      </p:ext>
+    </p:extLst>
+  </p:cSld>
+  <p:clrMapOvr>
+    <a:masterClrMapping/>
+  </p:clrMapOvr>
+</p:notes>
+</file>
+
+<file path=ppt/notesSlides/notesSlide11.xml><?xml version="1.0" encoding="utf-8"?>
+<p:notes xmlns:a="http://schemas.openxmlformats.org/drawingml/2006/main" xmlns:r="http://schemas.openxmlformats.org/officeDocument/2006/relationships" xmlns:p="http://schemas.openxmlformats.org/presentationml/2006/main">
+  <p:cSld>
+    <p:spTree>
+      <p:nvGrpSpPr>
+        <p:cNvPr id="1" name=""/>
+        <p:cNvGrpSpPr/>
+        <p:nvPr/>
+      </p:nvGrpSpPr>
+      <p:grpSpPr>
+        <a:xfrm>
+          <a:off x="0" y="0"/>
+          <a:ext cx="0" cy="0"/>
+          <a:chOff x="0" y="0"/>
+          <a:chExt cx="0" cy="0"/>
+        </a:xfrm>
+      </p:grpSpPr>
+      <p:sp>
+        <p:nvSpPr>
+          <p:cNvPr id="2" name="Espace réservé de l’image des diapositives 1"/>
+          <p:cNvSpPr>
+            <a:spLocks noGrp="1" noRot="1" noChangeAspect="1"/>
+          </p:cNvSpPr>
+          <p:nvPr>
+            <p:ph type="sldImg"/>
+          </p:nvPr>
+        </p:nvSpPr>
+        <p:spPr/>
+      </p:sp>
+      <p:sp>
+        <p:nvSpPr>
+          <p:cNvPr id="3" name="Espace réservé des commentaires 2"/>
+          <p:cNvSpPr>
+            <a:spLocks noGrp="1"/>
+          </p:cNvSpPr>
+          <p:nvPr>
+            <p:ph type="body" idx="1"/>
+          </p:nvPr>
+        </p:nvSpPr>
+        <p:spPr/>
+        <p:txBody>
+          <a:bodyPr rtlCol="0"/>
+          <a:lstStyle/>
+          <a:p>
+            <a:pPr marL="0" marR="0" lvl="0" indent="0" algn="l" defTabSz="914400" rtl="0" eaLnBrk="1" fontAlgn="auto" latinLnBrk="0" hangingPunct="1">
+              <a:lnSpc>
+                <a:spcPct val="100000"/>
+              </a:lnSpc>
+              <a:spcBef>
+                <a:spcPts val="0"/>
+              </a:spcBef>
+              <a:spcAft>
+                <a:spcPts val="0"/>
+              </a:spcAft>
+              <a:buClrTx/>
+              <a:buSzTx/>
+              <a:buFontTx/>
+              <a:buNone/>
+              <a:tabLst/>
+              <a:defRPr/>
+            </a:pPr>
+            <a:r>
+              <a:rPr lang="fr-FR">
+                <a:latin typeface="Tahoma" panose="020B0604030504040204" pitchFamily="34" charset="0"/>
+                <a:ea typeface="Tahoma" panose="020B0604030504040204" pitchFamily="34" charset="0"/>
+                <a:cs typeface="Tahoma" panose="020B0604030504040204" pitchFamily="34" charset="0"/>
+              </a:rPr>
+              <a:t>L’argument contraire doit être celui le plus fréquemment mentionné en contradiction de la thèse.  L’objectif de cette diapositive est d’évoquer l’argument contraire de façon à renforcer la thèse d’origine.  Veillez à évoquer chaque information contradictoire.  Dans cette perspective, développez les points inclus sur la diapositive.  Veillez à faire la transition vers la diapositive finale, l’étape d’action.</a:t>
+            </a:r>
+          </a:p>
+          <a:p>
+            <a:pPr rtl="0"/>
+            <a:endParaRPr lang="fr-FR"/>
+          </a:p>
+        </p:txBody>
+      </p:sp>
+      <p:sp>
+        <p:nvSpPr>
+          <p:cNvPr id="4" name="Espace réservé du numéro de diapositive 3"/>
+          <p:cNvSpPr>
+            <a:spLocks noGrp="1"/>
+          </p:cNvSpPr>
+          <p:nvPr>
+            <p:ph type="sldNum" sz="quarter" idx="10"/>
+          </p:nvPr>
+        </p:nvSpPr>
+        <p:spPr/>
+        <p:txBody>
+          <a:bodyPr rtlCol="0"/>
+          <a:lstStyle/>
+          <a:p>
+            <a:pPr rtl="0"/>
+            <a:fld id="{E6AEB063-7F11-4E3B-BA52-07405B1C2D95}" type="slidenum">
+              <a:rPr lang="fr-FR" smtClean="0"/>
+              <a:t>15</a:t>
             </a:fld>
             <a:endParaRPr lang="fr-FR"/>
           </a:p>
@@ -1783,7 +1901,7 @@
     </p:spTree>
     <p:extLst>
       <p:ext uri="{BB962C8B-B14F-4D97-AF65-F5344CB8AC3E}">
-        <p14:creationId xmlns:p14="http://schemas.microsoft.com/office/powerpoint/2010/main" val="1237864018"/>
+        <p14:creationId xmlns:p14="http://schemas.microsoft.com/office/powerpoint/2010/main" val="2769945010"/>
       </p:ext>
     </p:extLst>
   </p:cSld>
@@ -1837,6 +1955,28 @@
           <a:bodyPr rtlCol="0"/>
           <a:lstStyle/>
           <a:p>
+            <a:pPr rtl="0"/>
+            <a:r>
+              <a:rPr lang="fr-FR">
+                <a:latin typeface="Tahoma" panose="020B0604030504040204" pitchFamily="34" charset="0"/>
+                <a:ea typeface="Tahoma" panose="020B0604030504040204" pitchFamily="34" charset="0"/>
+                <a:cs typeface="Tahoma" panose="020B0604030504040204" pitchFamily="34" charset="0"/>
+              </a:rPr>
+              <a:t>Dédiez cette diapositive entière à l’énoncé de la thèse.  Il s’agit de la raison majeure pour laquelle l’argumentaire a été développé.  Révélez à ce moment les trois points principaux de l’argumentaire (diapositives 4, 5 et 6) afin de fournir un aperçu de l’orientation de l’argumentaire :</a:t>
+            </a:r>
+          </a:p>
+          <a:p>
+            <a:pPr rtl="0"/>
+            <a:r>
+              <a:rPr lang="fr-FR">
+                <a:latin typeface="Tahoma" panose="020B0604030504040204" pitchFamily="34" charset="0"/>
+                <a:ea typeface="Tahoma" panose="020B0604030504040204" pitchFamily="34" charset="0"/>
+                <a:cs typeface="Tahoma" panose="020B0604030504040204" pitchFamily="34" charset="0"/>
+              </a:rPr>
+              <a:t>-[Tapez le point principal 1 ici]</a:t>
+            </a:r>
+          </a:p>
+          <a:p>
             <a:pPr marL="0" marR="0" lvl="0" indent="0" algn="l" defTabSz="914400" rtl="0" eaLnBrk="1" fontAlgn="auto" latinLnBrk="0" hangingPunct="1">
               <a:lnSpc>
                 <a:spcPct val="100000"/>
@@ -1860,12 +2000,54 @@
                 <a:ea typeface="Tahoma" panose="020B0604030504040204" pitchFamily="34" charset="0"/>
                 <a:cs typeface="Tahoma" panose="020B0604030504040204" pitchFamily="34" charset="0"/>
               </a:rPr>
-              <a:t>L’argument contraire doit être celui le plus fréquemment mentionné en contradiction de la thèse.  L’objectif de cette diapositive est d’évoquer l’argument contraire de façon à renforcer la thèse d’origine.  Veillez à évoquer chaque information contradictoire.  Dans cette perspective, développez les points inclus sur la diapositive.  Veillez à faire la transition vers la diapositive finale, l’étape d’action.</a:t>
-            </a:r>
-          </a:p>
-          <a:p>
-            <a:pPr rtl="0"/>
-            <a:endParaRPr lang="fr-FR"/>
+              <a:t>-[Tapez le point principal 2 ici]</a:t>
+            </a:r>
+          </a:p>
+          <a:p>
+            <a:pPr marL="0" marR="0" lvl="0" indent="0" algn="l" defTabSz="914400" rtl="0" eaLnBrk="1" fontAlgn="auto" latinLnBrk="0" hangingPunct="1">
+              <a:lnSpc>
+                <a:spcPct val="100000"/>
+              </a:lnSpc>
+              <a:spcBef>
+                <a:spcPts val="0"/>
+              </a:spcBef>
+              <a:spcAft>
+                <a:spcPts val="0"/>
+              </a:spcAft>
+              <a:buClrTx/>
+              <a:buSzTx/>
+              <a:buFontTx/>
+              <a:buNone/>
+              <a:tabLst/>
+              <a:defRPr/>
+            </a:pPr>
+            <a:r>
+              <a:rPr lang="fr-FR">
+                <a:latin typeface="Tahoma" panose="020B0604030504040204" pitchFamily="34" charset="0"/>
+                <a:ea typeface="Tahoma" panose="020B0604030504040204" pitchFamily="34" charset="0"/>
+                <a:cs typeface="Tahoma" panose="020B0604030504040204" pitchFamily="34" charset="0"/>
+              </a:rPr>
+              <a:t>-[Tapez le point principal 3 ici]</a:t>
+            </a:r>
+          </a:p>
+          <a:p>
+            <a:pPr rtl="0"/>
+            <a:r>
+              <a:rPr lang="fr-FR">
+                <a:latin typeface="Tahoma" panose="020B0604030504040204" pitchFamily="34" charset="0"/>
+                <a:ea typeface="Tahoma" panose="020B0604030504040204" pitchFamily="34" charset="0"/>
+                <a:cs typeface="Tahoma" panose="020B0604030504040204" pitchFamily="34" charset="0"/>
+              </a:rPr>
+              <a:t>Veillez à faire la transition entre le premier point principal et la diapositive suivante.</a:t>
+            </a:r>
+          </a:p>
+          <a:p>
+            <a:pPr rtl="0"/>
+            <a:endParaRPr lang="fr-FR">
+              <a:latin typeface="Tahoma" panose="020B0604030504040204" pitchFamily="34" charset="0"/>
+              <a:ea typeface="Tahoma" panose="020B0604030504040204" pitchFamily="34" charset="0"/>
+              <a:cs typeface="Tahoma" panose="020B0604030504040204" pitchFamily="34" charset="0"/>
+            </a:endParaRPr>
           </a:p>
         </p:txBody>
       </p:sp>
@@ -1887,7 +2069,7 @@
             <a:pPr rtl="0"/>
             <a:fld id="{E6AEB063-7F11-4E3B-BA52-07405B1C2D95}" type="slidenum">
               <a:rPr lang="fr-FR" smtClean="0"/>
-              <a:t>8</a:t>
+              <a:t>12</a:t>
             </a:fld>
             <a:endParaRPr lang="fr-FR"/>
           </a:p>
@@ -1896,7 +2078,7 @@
     </p:spTree>
     <p:extLst>
       <p:ext uri="{BB962C8B-B14F-4D97-AF65-F5344CB8AC3E}">
-        <p14:creationId xmlns:p14="http://schemas.microsoft.com/office/powerpoint/2010/main" val="3730541742"/>
+        <p14:creationId xmlns:p14="http://schemas.microsoft.com/office/powerpoint/2010/main" val="1237864018"/>
       </p:ext>
     </p:extLst>
   </p:cSld>
@@ -2000,7 +2182,7 @@
             <a:pPr rtl="0"/>
             <a:fld id="{E6AEB063-7F11-4E3B-BA52-07405B1C2D95}" type="slidenum">
               <a:rPr lang="fr-FR" smtClean="0"/>
-              <a:t>9</a:t>
+              <a:t>13</a:t>
             </a:fld>
             <a:endParaRPr lang="fr-FR"/>
           </a:p>
@@ -2009,7 +2191,7 @@
     </p:spTree>
     <p:extLst>
       <p:ext uri="{BB962C8B-B14F-4D97-AF65-F5344CB8AC3E}">
-        <p14:creationId xmlns:p14="http://schemas.microsoft.com/office/powerpoint/2010/main" val="1317945858"/>
+        <p14:creationId xmlns:p14="http://schemas.microsoft.com/office/powerpoint/2010/main" val="3730541742"/>
       </p:ext>
     </p:extLst>
   </p:cSld>
@@ -2367,7 +2549,7 @@
             <a:pPr rtl="0"/>
             <a:fld id="{B84BE616-57AD-451C-BDB9-B1D8D0E40CD2}" type="datetime1">
               <a:rPr lang="fr-FR" noProof="0" smtClean="0"/>
-              <a:t>07/10/2021</a:t>
+              <a:t>08/10/2021</a:t>
             </a:fld>
             <a:endParaRPr lang="fr-FR" noProof="0"/>
           </a:p>
@@ -2723,7 +2905,7 @@
             <a:pPr rtl="0"/>
             <a:fld id="{0CB3D2D9-DDF1-4439-A1D0-5334126546D0}" type="datetime1">
               <a:rPr lang="fr-FR" noProof="0" smtClean="0"/>
-              <a:t>07/10/2021</a:t>
+              <a:t>08/10/2021</a:t>
             </a:fld>
             <a:endParaRPr lang="fr-FR" noProof="0"/>
           </a:p>
@@ -3211,7 +3393,7 @@
             <a:pPr rtl="0"/>
             <a:fld id="{1C474853-0F44-4B5D-8032-02BC545F3EE0}" type="datetime1">
               <a:rPr lang="fr-FR" noProof="0" smtClean="0"/>
-              <a:t>07/10/2021</a:t>
+              <a:t>08/10/2021</a:t>
             </a:fld>
             <a:endParaRPr lang="fr-FR" noProof="0"/>
           </a:p>
@@ -3449,7 +3631,7 @@
             <a:pPr rtl="0"/>
             <a:fld id="{7A446534-40C3-486B-94C6-E98203D43151}" type="datetime1">
               <a:rPr lang="fr-FR" noProof="0" smtClean="0"/>
-              <a:t>07/10/2021</a:t>
+              <a:t>08/10/2021</a:t>
             </a:fld>
             <a:endParaRPr lang="fr-FR" noProof="0"/>
           </a:p>
@@ -3550,7 +3732,7 @@
             <a:pPr rtl="0"/>
             <a:fld id="{42A3DF54-B654-4969-9346-CCB10ABB1B36}" type="datetime1">
               <a:rPr lang="fr-FR" noProof="0" smtClean="0"/>
-              <a:t>07/10/2021</a:t>
+              <a:t>08/10/2021</a:t>
             </a:fld>
             <a:endParaRPr lang="fr-FR" noProof="0"/>
           </a:p>
@@ -4029,7 +4211,7 @@
             <a:pPr rtl="0"/>
             <a:fld id="{CC17327C-E19B-48C6-9C2B-F4F3E49E8996}" type="datetime1">
               <a:rPr lang="fr-FR" noProof="0" smtClean="0"/>
-              <a:t>07/10/2021</a:t>
+              <a:t>08/10/2021</a:t>
             </a:fld>
             <a:endParaRPr lang="fr-FR" noProof="0"/>
           </a:p>
@@ -4530,7 +4712,7 @@
             <a:pPr rtl="0"/>
             <a:fld id="{A40781D1-B0D5-4211-A2A4-38EC0A55EC96}" type="datetime1">
               <a:rPr lang="fr-FR" noProof="0" smtClean="0"/>
-              <a:t>07/10/2021</a:t>
+              <a:t>08/10/2021</a:t>
             </a:fld>
             <a:endParaRPr lang="fr-FR" noProof="0"/>
           </a:p>
@@ -4912,7 +5094,7 @@
             <a:pPr rtl="0"/>
             <a:fld id="{A545BFD4-A91F-4562-83D0-93641F3D9128}" type="datetime1">
               <a:rPr lang="fr-FR" noProof="0" smtClean="0"/>
-              <a:t>07/10/2021</a:t>
+              <a:t>08/10/2021</a:t>
             </a:fld>
             <a:endParaRPr lang="fr-FR" noProof="0"/>
           </a:p>
@@ -5229,7 +5411,7 @@
             <a:pPr rtl="0"/>
             <a:fld id="{9C7C140E-782D-4E9E-894C-893102EB4961}" type="datetime1">
               <a:rPr lang="fr-FR" noProof="0" smtClean="0"/>
-              <a:t>07/10/2021</a:t>
+              <a:t>08/10/2021</a:t>
             </a:fld>
             <a:endParaRPr lang="fr-FR" noProof="0"/>
           </a:p>
@@ -5549,7 +5731,7 @@
             <a:pPr rtl="0"/>
             <a:fld id="{F5DCC735-4836-438E-94B4-052A67B7C164}" type="datetime1">
               <a:rPr lang="fr-FR" noProof="0" smtClean="0"/>
-              <a:t>07/10/2021</a:t>
+              <a:t>08/10/2021</a:t>
             </a:fld>
             <a:endParaRPr lang="fr-FR" noProof="0"/>
           </a:p>
@@ -5848,7 +6030,7 @@
             <a:pPr rtl="0"/>
             <a:fld id="{702FA6E0-C921-4D7E-B62B-EC7BFBAE24C9}" type="datetime1">
               <a:rPr lang="fr-FR" noProof="0" smtClean="0"/>
-              <a:t>07/10/2021</a:t>
+              <a:t>08/10/2021</a:t>
             </a:fld>
             <a:endParaRPr lang="fr-FR" noProof="0"/>
           </a:p>
@@ -6172,7 +6354,7 @@
             <a:pPr rtl="0"/>
             <a:fld id="{87B74A97-18C2-432A-81AC-76BF6BC9B532}" type="datetime1">
               <a:rPr lang="fr-FR" noProof="0" smtClean="0"/>
-              <a:t>07/10/2021</a:t>
+              <a:t>08/10/2021</a:t>
             </a:fld>
             <a:endParaRPr lang="fr-FR" noProof="0"/>
           </a:p>
@@ -6650,7 +6832,7 @@
             <a:pPr rtl="0"/>
             <a:fld id="{F8AD7DCA-FC5E-453D-B277-FD07E71F8824}" type="datetime1">
               <a:rPr lang="fr-FR" noProof="0" smtClean="0"/>
-              <a:t>07/10/2021</a:t>
+              <a:t>08/10/2021</a:t>
             </a:fld>
             <a:endParaRPr lang="fr-FR" noProof="0"/>
           </a:p>
@@ -6990,7 +7172,7 @@
             <a:pPr rtl="0"/>
             <a:fld id="{C682F63A-35CB-46AE-9C1D-159D6C6BF117}" type="datetime1">
               <a:rPr lang="fr-FR" noProof="0" smtClean="0"/>
-              <a:t>07/10/2021</a:t>
+              <a:t>08/10/2021</a:t>
             </a:fld>
             <a:endParaRPr lang="fr-FR" noProof="0"/>
           </a:p>
@@ -7385,7 +7567,7 @@
             <a:pPr rtl="0"/>
             <a:fld id="{D0286CBF-0642-4926-8D76-3325A476758C}" type="datetime1">
               <a:rPr lang="fr-FR" noProof="0" smtClean="0"/>
-              <a:t>07/10/2021</a:t>
+              <a:t>08/10/2021</a:t>
             </a:fld>
             <a:endParaRPr lang="fr-FR" noProof="0"/>
           </a:p>
@@ -7528,7 +7710,7 @@
             <a:pPr rtl="0"/>
             <a:fld id="{7561D99F-DFC4-428F-AE99-ADA3CD032D36}" type="datetime1">
               <a:rPr lang="fr-FR" noProof="0" smtClean="0"/>
-              <a:t>07/10/2021</a:t>
+              <a:t>08/10/2021</a:t>
             </a:fld>
             <a:endParaRPr lang="fr-FR" noProof="0"/>
           </a:p>
@@ -8233,7 +8415,7 @@
             <a:pPr rtl="0"/>
             <a:fld id="{3DF3897B-312A-440A-B21F-96636D9AADA9}" type="datetime1">
               <a:rPr lang="fr-FR" noProof="0" smtClean="0"/>
-              <a:t>07/10/2021</a:t>
+              <a:t>08/10/2021</a:t>
             </a:fld>
             <a:endParaRPr lang="fr-FR" noProof="0"/>
           </a:p>
@@ -8490,7 +8672,7 @@
             <a:pPr rtl="0"/>
             <a:fld id="{63D86642-8978-4E99-8117-E7C2E448BF50}" type="datetime1">
               <a:rPr lang="fr-FR" noProof="0" smtClean="0"/>
-              <a:t>07/10/2021</a:t>
+              <a:t>08/10/2021</a:t>
             </a:fld>
             <a:endParaRPr lang="fr-FR" noProof="0"/>
           </a:p>
@@ -9073,6 +9255,241 @@
           <p:cNvPr id="2" name="Titre 1">
             <a:extLst>
               <a:ext uri="{FF2B5EF4-FFF2-40B4-BE49-F238E27FC236}">
+                <a16:creationId xmlns:a16="http://schemas.microsoft.com/office/drawing/2014/main" id="{331BA3EC-3569-4AB9-897C-339585B8C31E}"/>
+              </a:ext>
+            </a:extLst>
+          </p:cNvPr>
+          <p:cNvSpPr>
+            <a:spLocks noGrp="1"/>
+          </p:cNvSpPr>
+          <p:nvPr>
+            <p:ph type="title"/>
+          </p:nvPr>
+        </p:nvSpPr>
+        <p:spPr/>
+        <p:txBody>
+          <a:bodyPr/>
+          <a:lstStyle/>
+          <a:p>
+            <a:r>
+              <a:rPr lang="en-US" dirty="0"/>
+              <a:t>Logistic regression</a:t>
+            </a:r>
+          </a:p>
+        </p:txBody>
+      </p:sp>
+      <p:sp>
+        <p:nvSpPr>
+          <p:cNvPr id="3" name="Espace réservé du contenu 2">
+            <a:extLst>
+              <a:ext uri="{FF2B5EF4-FFF2-40B4-BE49-F238E27FC236}">
+                <a16:creationId xmlns:a16="http://schemas.microsoft.com/office/drawing/2014/main" id="{94E138A8-506B-4007-BFF9-9C23A4F21E2D}"/>
+              </a:ext>
+            </a:extLst>
+          </p:cNvPr>
+          <p:cNvSpPr>
+            <a:spLocks noGrp="1"/>
+          </p:cNvSpPr>
+          <p:nvPr>
+            <p:ph sz="half" idx="2"/>
+          </p:nvPr>
+        </p:nvSpPr>
+        <p:spPr/>
+        <p:txBody>
+          <a:bodyPr/>
+          <a:lstStyle/>
+          <a:p>
+            <a:r>
+              <a:rPr lang="en-US" dirty="0"/>
+              <a:t>87% on predicting cardiovascular events https://iopscience.iop.org/article/10.1088/1742-6596/1693/1/012093/pdf</a:t>
+            </a:r>
+          </a:p>
+        </p:txBody>
+      </p:sp>
+    </p:spTree>
+    <p:extLst>
+      <p:ext uri="{BB962C8B-B14F-4D97-AF65-F5344CB8AC3E}">
+        <p14:creationId xmlns:p14="http://schemas.microsoft.com/office/powerpoint/2010/main" val="4280748681"/>
+      </p:ext>
+    </p:extLst>
+  </p:cSld>
+  <p:clrMapOvr>
+    <a:masterClrMapping/>
+  </p:clrMapOvr>
+</p:sld>
+</file>
+
+<file path=ppt/slides/slide11.xml><?xml version="1.0" encoding="utf-8"?>
+<p:sld xmlns:a="http://schemas.openxmlformats.org/drawingml/2006/main" xmlns:r="http://schemas.openxmlformats.org/officeDocument/2006/relationships" xmlns:p="http://schemas.openxmlformats.org/presentationml/2006/main">
+  <p:cSld>
+    <p:spTree>
+      <p:nvGrpSpPr>
+        <p:cNvPr id="1" name=""/>
+        <p:cNvGrpSpPr/>
+        <p:nvPr/>
+      </p:nvGrpSpPr>
+      <p:grpSpPr>
+        <a:xfrm>
+          <a:off x="0" y="0"/>
+          <a:ext cx="0" cy="0"/>
+          <a:chOff x="0" y="0"/>
+          <a:chExt cx="0" cy="0"/>
+        </a:xfrm>
+      </p:grpSpPr>
+      <p:sp>
+        <p:nvSpPr>
+          <p:cNvPr id="2" name="Titre 1">
+            <a:extLst>
+              <a:ext uri="{FF2B5EF4-FFF2-40B4-BE49-F238E27FC236}">
+                <a16:creationId xmlns:a16="http://schemas.microsoft.com/office/drawing/2014/main" id="{956E2E01-1970-4381-88A8-10C3766740B5}"/>
+              </a:ext>
+            </a:extLst>
+          </p:cNvPr>
+          <p:cNvSpPr>
+            <a:spLocks noGrp="1"/>
+          </p:cNvSpPr>
+          <p:nvPr>
+            <p:ph type="title"/>
+          </p:nvPr>
+        </p:nvSpPr>
+        <p:spPr/>
+        <p:txBody>
+          <a:bodyPr/>
+          <a:lstStyle/>
+          <a:p>
+            <a:r>
+              <a:rPr lang="en-US" dirty="0"/>
+              <a:t>Hybrid linear regression</a:t>
+            </a:r>
+          </a:p>
+        </p:txBody>
+      </p:sp>
+      <p:sp>
+        <p:nvSpPr>
+          <p:cNvPr id="3" name="Espace réservé du contenu 2">
+            <a:extLst>
+              <a:ext uri="{FF2B5EF4-FFF2-40B4-BE49-F238E27FC236}">
+                <a16:creationId xmlns:a16="http://schemas.microsoft.com/office/drawing/2014/main" id="{BA25AF77-8CBB-4446-9C4E-78FBACD9071E}"/>
+              </a:ext>
+            </a:extLst>
+          </p:cNvPr>
+          <p:cNvSpPr>
+            <a:spLocks noGrp="1"/>
+          </p:cNvSpPr>
+          <p:nvPr>
+            <p:ph sz="half" idx="2"/>
+          </p:nvPr>
+        </p:nvSpPr>
+        <p:spPr/>
+        <p:txBody>
+          <a:bodyPr/>
+          <a:lstStyle/>
+          <a:p>
+            <a:r>
+              <a:rPr lang="en-US" dirty="0"/>
+              <a:t>89% on heart disease prediction https://ejmcm.com/article_3785_56dea6128008c7563d95cb35313a0908.pdf</a:t>
+            </a:r>
+          </a:p>
+        </p:txBody>
+      </p:sp>
+    </p:spTree>
+    <p:extLst>
+      <p:ext uri="{BB962C8B-B14F-4D97-AF65-F5344CB8AC3E}">
+        <p14:creationId xmlns:p14="http://schemas.microsoft.com/office/powerpoint/2010/main" val="1387753063"/>
+      </p:ext>
+    </p:extLst>
+  </p:cSld>
+  <p:clrMapOvr>
+    <a:masterClrMapping/>
+  </p:clrMapOvr>
+</p:sld>
+</file>
+
+<file path=ppt/slides/slide12.xml><?xml version="1.0" encoding="utf-8"?>
+<p:sld xmlns:a="http://schemas.openxmlformats.org/drawingml/2006/main" xmlns:r="http://schemas.openxmlformats.org/officeDocument/2006/relationships" xmlns:p="http://schemas.openxmlformats.org/presentationml/2006/main">
+  <p:cSld>
+    <p:spTree>
+      <p:nvGrpSpPr>
+        <p:cNvPr id="1" name=""/>
+        <p:cNvGrpSpPr/>
+        <p:nvPr/>
+      </p:nvGrpSpPr>
+      <p:grpSpPr>
+        <a:xfrm>
+          <a:off x="0" y="0"/>
+          <a:ext cx="0" cy="0"/>
+          <a:chOff x="0" y="0"/>
+          <a:chExt cx="0" cy="0"/>
+        </a:xfrm>
+      </p:grpSpPr>
+      <p:sp>
+        <p:nvSpPr>
+          <p:cNvPr id="2" name="Titre 1">
+            <a:extLst>
+              <a:ext uri="{FF2B5EF4-FFF2-40B4-BE49-F238E27FC236}">
+                <a16:creationId xmlns:a16="http://schemas.microsoft.com/office/drawing/2014/main" id="{34E65665-583F-4DD8-814D-FECA92009E9A}"/>
+              </a:ext>
+            </a:extLst>
+          </p:cNvPr>
+          <p:cNvSpPr>
+            <a:spLocks noGrp="1"/>
+          </p:cNvSpPr>
+          <p:nvPr>
+            <p:ph type="title"/>
+          </p:nvPr>
+        </p:nvSpPr>
+        <p:spPr bwMode="white"/>
+        <p:txBody>
+          <a:bodyPr rtlCol="0"/>
+          <a:lstStyle/>
+          <a:p>
+            <a:pPr rtl="0"/>
+            <a:r>
+              <a:rPr lang="fr-FR" sz="4000" dirty="0"/>
+              <a:t>Our </a:t>
+            </a:r>
+            <a:r>
+              <a:rPr lang="en-US" sz="4000" dirty="0"/>
+              <a:t>approaches</a:t>
+            </a:r>
+          </a:p>
+        </p:txBody>
+      </p:sp>
+    </p:spTree>
+    <p:extLst>
+      <p:ext uri="{BB962C8B-B14F-4D97-AF65-F5344CB8AC3E}">
+        <p14:creationId xmlns:p14="http://schemas.microsoft.com/office/powerpoint/2010/main" val="408285704"/>
+      </p:ext>
+    </p:extLst>
+  </p:cSld>
+  <p:clrMapOvr>
+    <a:masterClrMapping/>
+  </p:clrMapOvr>
+</p:sld>
+</file>
+
+<file path=ppt/slides/slide13.xml><?xml version="1.0" encoding="utf-8"?>
+<p:sld xmlns:a="http://schemas.openxmlformats.org/drawingml/2006/main" xmlns:r="http://schemas.openxmlformats.org/officeDocument/2006/relationships" xmlns:p="http://schemas.openxmlformats.org/presentationml/2006/main">
+  <p:cSld>
+    <p:spTree>
+      <p:nvGrpSpPr>
+        <p:cNvPr id="1" name=""/>
+        <p:cNvGrpSpPr/>
+        <p:nvPr/>
+      </p:nvGrpSpPr>
+      <p:grpSpPr>
+        <a:xfrm>
+          <a:off x="0" y="0"/>
+          <a:ext cx="0" cy="0"/>
+          <a:chOff x="0" y="0"/>
+          <a:chExt cx="0" cy="0"/>
+        </a:xfrm>
+      </p:grpSpPr>
+      <p:sp>
+        <p:nvSpPr>
+          <p:cNvPr id="2" name="Titre 1">
+            <a:extLst>
+              <a:ext uri="{FF2B5EF4-FFF2-40B4-BE49-F238E27FC236}">
                 <a16:creationId xmlns:a16="http://schemas.microsoft.com/office/drawing/2014/main" id="{9ED597A3-CAEC-4FBF-94DF-5925729E0C97}"/>
               </a:ext>
             </a:extLst>
@@ -9091,8 +9508,16 @@
           <a:p>
             <a:pPr rtl="0"/>
             <a:r>
-              <a:rPr lang="en-US" dirty="0"/>
-              <a:t>Machine learning algorithms</a:t>
+              <a:rPr lang="fr-FR" dirty="0"/>
+              <a:t>Data </a:t>
+            </a:r>
+            <a:r>
+              <a:rPr lang="fr-FR" dirty="0" err="1"/>
+              <a:t>analysis</a:t>
+            </a:r>
+            <a:r>
+              <a:rPr lang="fr-FR" dirty="0"/>
+              <a:t> </a:t>
             </a:r>
           </a:p>
         </p:txBody>
@@ -9124,7 +9549,219 @@
                 <a:ea typeface="Tahoma" panose="020B0604030504040204" pitchFamily="34" charset="0"/>
                 <a:cs typeface="Tahoma" panose="020B0604030504040204" pitchFamily="34" charset="0"/>
               </a:rPr>
-              <a:t>Two approaches (We are probably going to do one linear regression and one deep learning).</a:t>
+              <a:t>Load up the data.</a:t>
+            </a:r>
+          </a:p>
+          <a:p>
+            <a:pPr rtl="0"/>
+            <a:r>
+              <a:rPr lang="en-US" dirty="0">
+                <a:ea typeface="Tahoma" panose="020B0604030504040204" pitchFamily="34" charset="0"/>
+                <a:cs typeface="Tahoma" panose="020B0604030504040204" pitchFamily="34" charset="0"/>
+              </a:rPr>
+              <a:t>Make graphics to make us able to understand the  of the data.</a:t>
+            </a:r>
+          </a:p>
+          <a:p>
+            <a:pPr rtl="0"/>
+            <a:r>
+              <a:rPr lang="en-US" dirty="0">
+                <a:ea typeface="Tahoma" panose="020B0604030504040204" pitchFamily="34" charset="0"/>
+                <a:cs typeface="Tahoma" panose="020B0604030504040204" pitchFamily="34" charset="0"/>
+              </a:rPr>
+              <a:t>Remove the variable that don’t have a huge impact on the results.</a:t>
+            </a:r>
+          </a:p>
+        </p:txBody>
+      </p:sp>
+    </p:spTree>
+    <p:extLst>
+      <p:ext uri="{BB962C8B-B14F-4D97-AF65-F5344CB8AC3E}">
+        <p14:creationId xmlns:p14="http://schemas.microsoft.com/office/powerpoint/2010/main" val="1729462857"/>
+      </p:ext>
+    </p:extLst>
+  </p:cSld>
+  <p:clrMapOvr>
+    <a:masterClrMapping/>
+  </p:clrMapOvr>
+</p:sld>
+</file>
+
+<file path=ppt/slides/slide14.xml><?xml version="1.0" encoding="utf-8"?>
+<p:sld xmlns:a="http://schemas.openxmlformats.org/drawingml/2006/main" xmlns:r="http://schemas.openxmlformats.org/officeDocument/2006/relationships" xmlns:p="http://schemas.openxmlformats.org/presentationml/2006/main">
+  <p:cSld>
+    <p:spTree>
+      <p:nvGrpSpPr>
+        <p:cNvPr id="1" name=""/>
+        <p:cNvGrpSpPr/>
+        <p:nvPr/>
+      </p:nvGrpSpPr>
+      <p:grpSpPr>
+        <a:xfrm>
+          <a:off x="0" y="0"/>
+          <a:ext cx="0" cy="0"/>
+          <a:chOff x="0" y="0"/>
+          <a:chExt cx="0" cy="0"/>
+        </a:xfrm>
+      </p:grpSpPr>
+      <p:sp>
+        <p:nvSpPr>
+          <p:cNvPr id="2" name="Titre 1">
+            <a:extLst>
+              <a:ext uri="{FF2B5EF4-FFF2-40B4-BE49-F238E27FC236}">
+                <a16:creationId xmlns:a16="http://schemas.microsoft.com/office/drawing/2014/main" id="{9ED597A3-CAEC-4FBF-94DF-5925729E0C97}"/>
+              </a:ext>
+            </a:extLst>
+          </p:cNvPr>
+          <p:cNvSpPr>
+            <a:spLocks noGrp="1"/>
+          </p:cNvSpPr>
+          <p:nvPr>
+            <p:ph type="title"/>
+          </p:nvPr>
+        </p:nvSpPr>
+        <p:spPr bwMode="white"/>
+        <p:txBody>
+          <a:bodyPr rtlCol="0"/>
+          <a:lstStyle/>
+          <a:p>
+            <a:pPr rtl="0"/>
+            <a:r>
+              <a:rPr lang="fr-FR" dirty="0"/>
+              <a:t>Data clean</a:t>
+            </a:r>
+          </a:p>
+        </p:txBody>
+      </p:sp>
+      <p:sp>
+        <p:nvSpPr>
+          <p:cNvPr id="3" name="Espace réservé du contenu 2">
+            <a:extLst>
+              <a:ext uri="{FF2B5EF4-FFF2-40B4-BE49-F238E27FC236}">
+                <a16:creationId xmlns:a16="http://schemas.microsoft.com/office/drawing/2014/main" id="{77EF5FD3-E825-420F-8A22-D0B5F329468F}"/>
+              </a:ext>
+            </a:extLst>
+          </p:cNvPr>
+          <p:cNvSpPr>
+            <a:spLocks noGrp="1"/>
+          </p:cNvSpPr>
+          <p:nvPr>
+            <p:ph sz="half" idx="2"/>
+          </p:nvPr>
+        </p:nvSpPr>
+        <p:spPr/>
+        <p:txBody>
+          <a:bodyPr rtlCol="0"/>
+          <a:lstStyle/>
+          <a:p>
+            <a:pPr rtl="0"/>
+            <a:r>
+              <a:rPr lang="en-US" dirty="0">
+                <a:ea typeface="Tahoma" panose="020B0604030504040204" pitchFamily="34" charset="0"/>
+                <a:cs typeface="Tahoma" panose="020B0604030504040204" pitchFamily="34" charset="0"/>
+              </a:rPr>
+              <a:t>Fill in the gaps.</a:t>
+            </a:r>
+          </a:p>
+          <a:p>
+            <a:pPr rtl="0"/>
+            <a:r>
+              <a:rPr lang="en-US" dirty="0">
+                <a:ea typeface="Tahoma" panose="020B0604030504040204" pitchFamily="34" charset="0"/>
+                <a:cs typeface="Tahoma" panose="020B0604030504040204" pitchFamily="34" charset="0"/>
+              </a:rPr>
+              <a:t>Remove useless columns.</a:t>
+            </a:r>
+          </a:p>
+        </p:txBody>
+      </p:sp>
+    </p:spTree>
+    <p:extLst>
+      <p:ext uri="{BB962C8B-B14F-4D97-AF65-F5344CB8AC3E}">
+        <p14:creationId xmlns:p14="http://schemas.microsoft.com/office/powerpoint/2010/main" val="1992955219"/>
+      </p:ext>
+    </p:extLst>
+  </p:cSld>
+  <p:clrMapOvr>
+    <a:masterClrMapping/>
+  </p:clrMapOvr>
+</p:sld>
+</file>
+
+<file path=ppt/slides/slide15.xml><?xml version="1.0" encoding="utf-8"?>
+<p:sld xmlns:a="http://schemas.openxmlformats.org/drawingml/2006/main" xmlns:r="http://schemas.openxmlformats.org/officeDocument/2006/relationships" xmlns:p="http://schemas.openxmlformats.org/presentationml/2006/main">
+  <p:cSld>
+    <p:spTree>
+      <p:nvGrpSpPr>
+        <p:cNvPr id="1" name=""/>
+        <p:cNvGrpSpPr/>
+        <p:nvPr/>
+      </p:nvGrpSpPr>
+      <p:grpSpPr>
+        <a:xfrm>
+          <a:off x="0" y="0"/>
+          <a:ext cx="0" cy="0"/>
+          <a:chOff x="0" y="0"/>
+          <a:chExt cx="0" cy="0"/>
+        </a:xfrm>
+      </p:grpSpPr>
+      <p:sp>
+        <p:nvSpPr>
+          <p:cNvPr id="2" name="Titre 1">
+            <a:extLst>
+              <a:ext uri="{FF2B5EF4-FFF2-40B4-BE49-F238E27FC236}">
+                <a16:creationId xmlns:a16="http://schemas.microsoft.com/office/drawing/2014/main" id="{9ED597A3-CAEC-4FBF-94DF-5925729E0C97}"/>
+              </a:ext>
+            </a:extLst>
+          </p:cNvPr>
+          <p:cNvSpPr>
+            <a:spLocks noGrp="1"/>
+          </p:cNvSpPr>
+          <p:nvPr>
+            <p:ph type="title"/>
+          </p:nvPr>
+        </p:nvSpPr>
+        <p:spPr bwMode="white"/>
+        <p:txBody>
+          <a:bodyPr rtlCol="0"/>
+          <a:lstStyle/>
+          <a:p>
+            <a:pPr rtl="0"/>
+            <a:r>
+              <a:rPr lang="en-US" dirty="0"/>
+              <a:t>Machine learning algorithms</a:t>
+            </a:r>
+          </a:p>
+        </p:txBody>
+      </p:sp>
+      <p:sp>
+        <p:nvSpPr>
+          <p:cNvPr id="3" name="Espace réservé du contenu 2">
+            <a:extLst>
+              <a:ext uri="{FF2B5EF4-FFF2-40B4-BE49-F238E27FC236}">
+                <a16:creationId xmlns:a16="http://schemas.microsoft.com/office/drawing/2014/main" id="{77EF5FD3-E825-420F-8A22-D0B5F329468F}"/>
+              </a:ext>
+            </a:extLst>
+          </p:cNvPr>
+          <p:cNvSpPr>
+            <a:spLocks noGrp="1"/>
+          </p:cNvSpPr>
+          <p:nvPr>
+            <p:ph sz="half" idx="2"/>
+          </p:nvPr>
+        </p:nvSpPr>
+        <p:spPr/>
+        <p:txBody>
+          <a:bodyPr rtlCol="0"/>
+          <a:lstStyle/>
+          <a:p>
+            <a:pPr rtl="0"/>
+            <a:r>
+              <a:rPr lang="en-US" dirty="0">
+                <a:ea typeface="Tahoma" panose="020B0604030504040204" pitchFamily="34" charset="0"/>
+                <a:cs typeface="Tahoma" panose="020B0604030504040204" pitchFamily="34" charset="0"/>
+              </a:rPr>
+              <a:t>Two approaches (We are probably going to do one logistical regression and one decision tree).</a:t>
             </a:r>
           </a:p>
         </p:txBody>
@@ -9676,20 +10313,17 @@
           <a:p>
             <a:pPr rtl="0"/>
             <a:r>
-              <a:rPr lang="fr-FR" sz="4000" dirty="0"/>
-              <a:t>Our </a:t>
-            </a:r>
-            <a:r>
-              <a:rPr lang="en-US" sz="4000" dirty="0"/>
-              <a:t>approaches</a:t>
-            </a:r>
+              <a:rPr lang="fr-FR" sz="4000" dirty="0" err="1"/>
+              <a:t>Research</a:t>
+            </a:r>
+            <a:endParaRPr lang="fr-FR" sz="4000" dirty="0"/>
           </a:p>
         </p:txBody>
       </p:sp>
     </p:spTree>
     <p:extLst>
       <p:ext uri="{BB962C8B-B14F-4D97-AF65-F5344CB8AC3E}">
-        <p14:creationId xmlns:p14="http://schemas.microsoft.com/office/powerpoint/2010/main" val="408285704"/>
+        <p14:creationId xmlns:p14="http://schemas.microsoft.com/office/powerpoint/2010/main" val="3514641903"/>
       </p:ext>
     </p:extLst>
   </p:cSld>
@@ -9721,7 +10355,7 @@
           <p:cNvPr id="2" name="Titre 1">
             <a:extLst>
               <a:ext uri="{FF2B5EF4-FFF2-40B4-BE49-F238E27FC236}">
-                <a16:creationId xmlns:a16="http://schemas.microsoft.com/office/drawing/2014/main" id="{9ED597A3-CAEC-4FBF-94DF-5925729E0C97}"/>
+                <a16:creationId xmlns:a16="http://schemas.microsoft.com/office/drawing/2014/main" id="{956E2E01-1970-4381-88A8-10C3766740B5}"/>
               </a:ext>
             </a:extLst>
           </p:cNvPr>
@@ -9732,23 +10366,14 @@
             <p:ph type="title"/>
           </p:nvPr>
         </p:nvSpPr>
-        <p:spPr bwMode="white"/>
-        <p:txBody>
-          <a:bodyPr rtlCol="0"/>
+        <p:spPr/>
+        <p:txBody>
+          <a:bodyPr/>
           <a:lstStyle/>
           <a:p>
-            <a:pPr rtl="0"/>
-            <a:r>
-              <a:rPr lang="fr-FR" dirty="0"/>
-              <a:t>Data </a:t>
-            </a:r>
-            <a:r>
-              <a:rPr lang="fr-FR" dirty="0" err="1"/>
-              <a:t>analysis</a:t>
-            </a:r>
-            <a:r>
-              <a:rPr lang="fr-FR" dirty="0"/>
-              <a:t> </a:t>
+            <a:r>
+              <a:rPr lang="en-US" dirty="0"/>
+              <a:t>Decision tree</a:t>
             </a:r>
           </a:p>
         </p:txBody>
@@ -9758,7 +10383,7 @@
           <p:cNvPr id="3" name="Espace réservé du contenu 2">
             <a:extLst>
               <a:ext uri="{FF2B5EF4-FFF2-40B4-BE49-F238E27FC236}">
-                <a16:creationId xmlns:a16="http://schemas.microsoft.com/office/drawing/2014/main" id="{77EF5FD3-E825-420F-8A22-D0B5F329468F}"/>
+                <a16:creationId xmlns:a16="http://schemas.microsoft.com/office/drawing/2014/main" id="{BA25AF77-8CBB-4446-9C4E-78FBACD9071E}"/>
               </a:ext>
             </a:extLst>
           </p:cNvPr>
@@ -9771,36 +10396,25 @@
         </p:nvSpPr>
         <p:spPr/>
         <p:txBody>
-          <a:bodyPr rtlCol="0"/>
+          <a:bodyPr/>
           <a:lstStyle/>
           <a:p>
-            <a:pPr rtl="0"/>
+            <a:r>
+              <a:rPr lang="en-US" dirty="0"/>
+              <a:t>Random forest 78 % on cardiovascular disease development prediction </a:t>
+            </a:r>
             <a:r>
               <a:rPr lang="en-US" dirty="0">
-                <a:ea typeface="Tahoma" panose="020B0604030504040204" pitchFamily="34" charset="0"/>
-                <a:cs typeface="Tahoma" panose="020B0604030504040204" pitchFamily="34" charset="0"/>
+                <a:hlinkClick r:id="rId2"/>
               </a:rPr>
-              <a:t>Load up the data.</a:t>
-            </a:r>
-          </a:p>
-          <a:p>
-            <a:pPr rtl="0"/>
-            <a:r>
-              <a:rPr lang="en-US" dirty="0">
-                <a:ea typeface="Tahoma" panose="020B0604030504040204" pitchFamily="34" charset="0"/>
-                <a:cs typeface="Tahoma" panose="020B0604030504040204" pitchFamily="34" charset="0"/>
-              </a:rPr>
-              <a:t>Make graphics to make us able to understand the  of the data.</a:t>
-            </a:r>
-          </a:p>
-          <a:p>
-            <a:pPr rtl="0"/>
-            <a:r>
-              <a:rPr lang="en-US" dirty="0">
-                <a:ea typeface="Tahoma" panose="020B0604030504040204" pitchFamily="34" charset="0"/>
-                <a:cs typeface="Tahoma" panose="020B0604030504040204" pitchFamily="34" charset="0"/>
-              </a:rPr>
-              <a:t>Remove the variable that don’t have a huge impact on the results.</a:t>
+              <a:t>https://www.nature.com/articles/s41598-020-62133-5.pdf</a:t>
+            </a:r>
+            <a:endParaRPr lang="en-US" dirty="0"/>
+          </a:p>
+          <a:p>
+            <a:r>
+              <a:rPr lang="en-US" dirty="0"/>
+              <a:t>Decision tree J48 98% on predicting if someone has developed heart disease or not. https://bmcbioinformatics.biomedcentral.com/track/pdf/10.1186/s12859-020-03626-y.pdf</a:t>
             </a:r>
           </a:p>
         </p:txBody>
@@ -9808,7 +10422,7 @@
     </p:spTree>
     <p:extLst>
       <p:ext uri="{BB962C8B-B14F-4D97-AF65-F5344CB8AC3E}">
-        <p14:creationId xmlns:p14="http://schemas.microsoft.com/office/powerpoint/2010/main" val="1729462857"/>
+        <p14:creationId xmlns:p14="http://schemas.microsoft.com/office/powerpoint/2010/main" val="936256935"/>
       </p:ext>
     </p:extLst>
   </p:cSld>
@@ -9840,7 +10454,7 @@
           <p:cNvPr id="2" name="Titre 1">
             <a:extLst>
               <a:ext uri="{FF2B5EF4-FFF2-40B4-BE49-F238E27FC236}">
-                <a16:creationId xmlns:a16="http://schemas.microsoft.com/office/drawing/2014/main" id="{9ED597A3-CAEC-4FBF-94DF-5925729E0C97}"/>
+                <a16:creationId xmlns:a16="http://schemas.microsoft.com/office/drawing/2014/main" id="{60EA2E4A-FC29-4E7D-9ACF-D3D433334EA1}"/>
               </a:ext>
             </a:extLst>
           </p:cNvPr>
@@ -9851,15 +10465,18 @@
             <p:ph type="title"/>
           </p:nvPr>
         </p:nvSpPr>
-        <p:spPr bwMode="white"/>
-        <p:txBody>
-          <a:bodyPr rtlCol="0"/>
+        <p:spPr/>
+        <p:txBody>
+          <a:bodyPr/>
           <a:lstStyle/>
           <a:p>
-            <a:pPr rtl="0"/>
-            <a:r>
-              <a:rPr lang="fr-FR" dirty="0"/>
-              <a:t>Data clean</a:t>
+            <a:r>
+              <a:rPr lang="en-US" dirty="0" err="1"/>
+              <a:t>Descision</a:t>
+            </a:r>
+            <a:r>
+              <a:rPr lang="en-US" dirty="0"/>
+              <a:t> table</a:t>
             </a:r>
           </a:p>
         </p:txBody>
@@ -9869,7 +10486,7 @@
           <p:cNvPr id="3" name="Espace réservé du contenu 2">
             <a:extLst>
               <a:ext uri="{FF2B5EF4-FFF2-40B4-BE49-F238E27FC236}">
-                <a16:creationId xmlns:a16="http://schemas.microsoft.com/office/drawing/2014/main" id="{77EF5FD3-E825-420F-8A22-D0B5F329468F}"/>
+                <a16:creationId xmlns:a16="http://schemas.microsoft.com/office/drawing/2014/main" id="{060239A8-3AFA-4AD0-93C1-F97C71A9F176}"/>
               </a:ext>
             </a:extLst>
           </p:cNvPr>
@@ -9882,26 +10499,12 @@
         </p:nvSpPr>
         <p:spPr/>
         <p:txBody>
-          <a:bodyPr rtlCol="0"/>
+          <a:bodyPr/>
           <a:lstStyle/>
           <a:p>
-            <a:pPr rtl="0"/>
-            <a:r>
-              <a:rPr lang="en-US" dirty="0">
-                <a:ea typeface="Tahoma" panose="020B0604030504040204" pitchFamily="34" charset="0"/>
-                <a:cs typeface="Tahoma" panose="020B0604030504040204" pitchFamily="34" charset="0"/>
-              </a:rPr>
-              <a:t>Fill in the gaps.</a:t>
-            </a:r>
-          </a:p>
-          <a:p>
-            <a:pPr rtl="0"/>
-            <a:r>
-              <a:rPr lang="en-US" dirty="0">
-                <a:ea typeface="Tahoma" panose="020B0604030504040204" pitchFamily="34" charset="0"/>
-                <a:cs typeface="Tahoma" panose="020B0604030504040204" pitchFamily="34" charset="0"/>
-              </a:rPr>
-              <a:t>Remove useless columns.</a:t>
+            <a:r>
+              <a:rPr lang="en-US" dirty="0"/>
+              <a:t>93% predicting cardiovascular disease from patient data https://bmcbioinformatics.biomedcentral.com/track/pdf/10.1186/s12859-020-03626-y.pdf</a:t>
             </a:r>
           </a:p>
         </p:txBody>
@@ -9909,7 +10512,7 @@
     </p:spTree>
     <p:extLst>
       <p:ext uri="{BB962C8B-B14F-4D97-AF65-F5344CB8AC3E}">
-        <p14:creationId xmlns:p14="http://schemas.microsoft.com/office/powerpoint/2010/main" val="1992955219"/>
+        <p14:creationId xmlns:p14="http://schemas.microsoft.com/office/powerpoint/2010/main" val="192317440"/>
       </p:ext>
     </p:extLst>
   </p:cSld>

</xml_diff>

<commit_message>
2 [MODIFY] Spelling mistake
Ready to merge directly
</commit_message>
<xml_diff>
--- a/Documentation/Study of posibilities.pptx
+++ b/Documentation/Study of posibilities.pptx
@@ -135,6 +135,14 @@
 </p:presentation>
 </file>
 
+<file path=ppt/revisionInfo.xml><?xml version="1.0" encoding="utf-8"?>
+<p1510:revInfo xmlns:a="http://schemas.openxmlformats.org/drawingml/2006/main" xmlns:r="http://schemas.openxmlformats.org/officeDocument/2006/relationships" xmlns:p1510="http://schemas.microsoft.com/office/powerpoint/2015/10/main">
+  <p1510:revLst>
+    <p1510:client id="{068DC9A0-771B-484E-9422-9A135081D6FA}" v="5" dt="2021-11-03T14:05:39.516"/>
+  </p1510:revLst>
+</p1510:revInfo>
+</file>
+
 <file path=ppt/handoutMasters/handoutMaster1.xml><?xml version="1.0" encoding="utf-8"?>
 <p:handoutMaster xmlns:a="http://schemas.openxmlformats.org/drawingml/2006/main" xmlns:r="http://schemas.openxmlformats.org/officeDocument/2006/relationships" xmlns:p="http://schemas.openxmlformats.org/presentationml/2006/main">
   <p:cSld>
@@ -231,7 +239,7 @@
             <a:pPr rtl="0"/>
             <a:fld id="{BAF1E655-8005-439B-A707-E0DFC1D589DB}" type="datetime1">
               <a:rPr lang="fr-FR" smtClean="0"/>
-              <a:t>08/10/2021</a:t>
+              <a:t>03/11/2021</a:t>
             </a:fld>
             <a:endParaRPr lang="fr-FR"/>
           </a:p>
@@ -311,7 +319,7 @@
             <a:pPr rtl="0"/>
             <a:fld id="{BD65BC62-3B36-43F8-8B69-D6E5E743DA31}" type="slidenum">
               <a:rPr lang="fr-FR" smtClean="0"/>
-              <a:t>‹N°›</a:t>
+              <a:t>‹#›</a:t>
             </a:fld>
             <a:endParaRPr lang="fr-FR"/>
           </a:p>
@@ -413,7 +421,7 @@
             <a:pPr rtl="0"/>
             <a:fld id="{A17E75E7-B22D-43B4-8F53-B0241C6C4C44}" type="datetime1">
               <a:rPr lang="fr-FR" noProof="0" smtClean="0"/>
-              <a:t>08/10/2021</a:t>
+              <a:t>03/11/2021</a:t>
             </a:fld>
             <a:endParaRPr lang="fr-FR" noProof="0"/>
           </a:p>
@@ -574,7 +582,7 @@
             <a:pPr rtl="0"/>
             <a:fld id="{E6AEB063-7F11-4E3B-BA52-07405B1C2D95}" type="slidenum">
               <a:rPr lang="fr-FR" noProof="0" smtClean="0"/>
-              <a:t>‹N°›</a:t>
+              <a:t>‹#›</a:t>
             </a:fld>
             <a:endParaRPr lang="fr-FR" noProof="0"/>
           </a:p>
@@ -2354,7 +2362,7 @@
           </a:effectLst>
           <a:extLst>
             <a:ext uri="{91240B29-F687-4f45-9708-019B960494DF}">
-              <a14:hiddenLine xmlns="" xmlns:a14="http://schemas.microsoft.com/office/drawing/2010/main" w="9525">
+              <a14:hiddenLine xmlns:a14="http://schemas.microsoft.com/office/drawing/2010/main" xmlns="" w="9525">
                 <a:solidFill>
                   <a:srgbClr val="000000"/>
                 </a:solidFill>
@@ -2549,7 +2557,7 @@
             <a:pPr rtl="0"/>
             <a:fld id="{B84BE616-57AD-451C-BDB9-B1D8D0E40CD2}" type="datetime1">
               <a:rPr lang="fr-FR" noProof="0" smtClean="0"/>
-              <a:t>08/10/2021</a:t>
+              <a:t>03/11/2021</a:t>
             </a:fld>
             <a:endParaRPr lang="fr-FR" noProof="0"/>
           </a:p>
@@ -2596,7 +2604,7 @@
             <a:pPr rtl="0"/>
             <a:fld id="{A4942799-31AF-4FF8-9D79-C1A3E01FB207}" type="slidenum">
               <a:rPr lang="fr-FR" noProof="0" smtClean="0"/>
-              <a:t>‹N°›</a:t>
+              <a:t>‹#›</a:t>
             </a:fld>
             <a:endParaRPr lang="fr-FR" noProof="0"/>
           </a:p>
@@ -2905,7 +2913,7 @@
             <a:pPr rtl="0"/>
             <a:fld id="{0CB3D2D9-DDF1-4439-A1D0-5334126546D0}" type="datetime1">
               <a:rPr lang="fr-FR" noProof="0" smtClean="0"/>
-              <a:t>08/10/2021</a:t>
+              <a:t>03/11/2021</a:t>
             </a:fld>
             <a:endParaRPr lang="fr-FR" noProof="0"/>
           </a:p>
@@ -2952,7 +2960,7 @@
             <a:pPr rtl="0"/>
             <a:fld id="{A4942799-31AF-4FF8-9D79-C1A3E01FB207}" type="slidenum">
               <a:rPr lang="fr-FR" noProof="0" smtClean="0"/>
-              <a:t>‹N°›</a:t>
+              <a:t>‹#›</a:t>
             </a:fld>
             <a:endParaRPr lang="fr-FR" noProof="0"/>
           </a:p>
@@ -3072,7 +3080,7 @@
           </a:effectLst>
           <a:extLst>
             <a:ext uri="{91240B29-F687-4f45-9708-019B960494DF}">
-              <a14:hiddenLine xmlns="" xmlns:a14="http://schemas.microsoft.com/office/drawing/2010/main" w="9525">
+              <a14:hiddenLine xmlns:a14="http://schemas.microsoft.com/office/drawing/2010/main" xmlns="" w="9525">
                 <a:solidFill>
                   <a:srgbClr val="000000"/>
                 </a:solidFill>
@@ -3393,7 +3401,7 @@
             <a:pPr rtl="0"/>
             <a:fld id="{1C474853-0F44-4B5D-8032-02BC545F3EE0}" type="datetime1">
               <a:rPr lang="fr-FR" noProof="0" smtClean="0"/>
-              <a:t>08/10/2021</a:t>
+              <a:t>03/11/2021</a:t>
             </a:fld>
             <a:endParaRPr lang="fr-FR" noProof="0"/>
           </a:p>
@@ -3440,7 +3448,7 @@
             <a:pPr rtl="0"/>
             <a:fld id="{A4942799-31AF-4FF8-9D79-C1A3E01FB207}" type="slidenum">
               <a:rPr lang="fr-FR" noProof="0" smtClean="0"/>
-              <a:t>‹N°›</a:t>
+              <a:t>‹#›</a:t>
             </a:fld>
             <a:endParaRPr lang="fr-FR" noProof="0"/>
           </a:p>
@@ -3560,7 +3568,7 @@
           </a:effectLst>
           <a:extLst>
             <a:ext uri="{91240B29-F687-4f45-9708-019B960494DF}">
-              <a14:hiddenLine xmlns="" xmlns:a14="http://schemas.microsoft.com/office/drawing/2010/main" w="9525">
+              <a14:hiddenLine xmlns:a14="http://schemas.microsoft.com/office/drawing/2010/main" xmlns="" w="9525">
                 <a:solidFill>
                   <a:srgbClr val="000000"/>
                 </a:solidFill>
@@ -3631,7 +3639,7 @@
             <a:pPr rtl="0"/>
             <a:fld id="{7A446534-40C3-486B-94C6-E98203D43151}" type="datetime1">
               <a:rPr lang="fr-FR" noProof="0" smtClean="0"/>
-              <a:t>08/10/2021</a:t>
+              <a:t>03/11/2021</a:t>
             </a:fld>
             <a:endParaRPr lang="fr-FR" noProof="0"/>
           </a:p>
@@ -3678,7 +3686,7 @@
             <a:pPr rtl="0"/>
             <a:fld id="{A4942799-31AF-4FF8-9D79-C1A3E01FB207}" type="slidenum">
               <a:rPr lang="fr-FR" noProof="0" smtClean="0"/>
-              <a:t>‹N°›</a:t>
+              <a:t>‹#›</a:t>
             </a:fld>
             <a:endParaRPr lang="fr-FR" noProof="0"/>
           </a:p>
@@ -3732,7 +3740,7 @@
             <a:pPr rtl="0"/>
             <a:fld id="{42A3DF54-B654-4969-9346-CCB10ABB1B36}" type="datetime1">
               <a:rPr lang="fr-FR" noProof="0" smtClean="0"/>
-              <a:t>08/10/2021</a:t>
+              <a:t>03/11/2021</a:t>
             </a:fld>
             <a:endParaRPr lang="fr-FR" noProof="0"/>
           </a:p>
@@ -3779,7 +3787,7 @@
             <a:pPr rtl="0"/>
             <a:fld id="{A4942799-31AF-4FF8-9D79-C1A3E01FB207}" type="slidenum">
               <a:rPr lang="fr-FR" noProof="0" smtClean="0"/>
-              <a:t>‹N°›</a:t>
+              <a:t>‹#›</a:t>
             </a:fld>
             <a:endParaRPr lang="fr-FR" noProof="0"/>
           </a:p>
@@ -4010,7 +4018,7 @@
           </a:effectLst>
           <a:extLst>
             <a:ext uri="{91240B29-F687-4f45-9708-019B960494DF}">
-              <a14:hiddenLine xmlns="" xmlns:a14="http://schemas.microsoft.com/office/drawing/2010/main" w="9525">
+              <a14:hiddenLine xmlns:a14="http://schemas.microsoft.com/office/drawing/2010/main" xmlns="" w="9525">
                 <a:solidFill>
                   <a:srgbClr val="000000"/>
                 </a:solidFill>
@@ -4211,7 +4219,7 @@
             <a:pPr rtl="0"/>
             <a:fld id="{CC17327C-E19B-48C6-9C2B-F4F3E49E8996}" type="datetime1">
               <a:rPr lang="fr-FR" noProof="0" smtClean="0"/>
-              <a:t>08/10/2021</a:t>
+              <a:t>03/11/2021</a:t>
             </a:fld>
             <a:endParaRPr lang="fr-FR" noProof="0"/>
           </a:p>
@@ -4258,7 +4266,7 @@
             <a:pPr rtl="0"/>
             <a:fld id="{A4942799-31AF-4FF8-9D79-C1A3E01FB207}" type="slidenum">
               <a:rPr lang="fr-FR" noProof="0" smtClean="0"/>
-              <a:t>‹N°›</a:t>
+              <a:t>‹#›</a:t>
             </a:fld>
             <a:endParaRPr lang="fr-FR" noProof="0"/>
           </a:p>
@@ -4712,7 +4720,7 @@
             <a:pPr rtl="0"/>
             <a:fld id="{A40781D1-B0D5-4211-A2A4-38EC0A55EC96}" type="datetime1">
               <a:rPr lang="fr-FR" noProof="0" smtClean="0"/>
-              <a:t>08/10/2021</a:t>
+              <a:t>03/11/2021</a:t>
             </a:fld>
             <a:endParaRPr lang="fr-FR" noProof="0"/>
           </a:p>
@@ -4759,7 +4767,7 @@
             <a:pPr rtl="0"/>
             <a:fld id="{A4942799-31AF-4FF8-9D79-C1A3E01FB207}" type="slidenum">
               <a:rPr lang="fr-FR" noProof="0" smtClean="0"/>
-              <a:t>‹N°›</a:t>
+              <a:t>‹#›</a:t>
             </a:fld>
             <a:endParaRPr lang="fr-FR" noProof="0"/>
           </a:p>
@@ -5094,7 +5102,7 @@
             <a:pPr rtl="0"/>
             <a:fld id="{A545BFD4-A91F-4562-83D0-93641F3D9128}" type="datetime1">
               <a:rPr lang="fr-FR" noProof="0" smtClean="0"/>
-              <a:t>08/10/2021</a:t>
+              <a:t>03/11/2021</a:t>
             </a:fld>
             <a:endParaRPr lang="fr-FR" noProof="0"/>
           </a:p>
@@ -5141,7 +5149,7 @@
             <a:pPr rtl="0"/>
             <a:fld id="{A4942799-31AF-4FF8-9D79-C1A3E01FB207}" type="slidenum">
               <a:rPr lang="fr-FR" noProof="0" smtClean="0"/>
-              <a:t>‹N°›</a:t>
+              <a:t>‹#›</a:t>
             </a:fld>
             <a:endParaRPr lang="fr-FR" noProof="0"/>
           </a:p>
@@ -5263,7 +5271,7 @@
           </a:effectLst>
           <a:extLst>
             <a:ext uri="{91240B29-F687-4f45-9708-019B960494DF}">
-              <a14:hiddenLine xmlns="" xmlns:a14="http://schemas.microsoft.com/office/drawing/2010/main" w="9525">
+              <a14:hiddenLine xmlns:a14="http://schemas.microsoft.com/office/drawing/2010/main" xmlns="" w="9525">
                 <a:solidFill>
                   <a:srgbClr val="000000"/>
                 </a:solidFill>
@@ -5411,7 +5419,7 @@
             <a:pPr rtl="0"/>
             <a:fld id="{9C7C140E-782D-4E9E-894C-893102EB4961}" type="datetime1">
               <a:rPr lang="fr-FR" noProof="0" smtClean="0"/>
-              <a:t>08/10/2021</a:t>
+              <a:t>03/11/2021</a:t>
             </a:fld>
             <a:endParaRPr lang="fr-FR" noProof="0"/>
           </a:p>
@@ -5458,7 +5466,7 @@
             <a:pPr rtl="0"/>
             <a:fld id="{A4942799-31AF-4FF8-9D79-C1A3E01FB207}" type="slidenum">
               <a:rPr lang="fr-FR" noProof="0" smtClean="0"/>
-              <a:t>‹N°›</a:t>
+              <a:t>‹#›</a:t>
             </a:fld>
             <a:endParaRPr lang="fr-FR" noProof="0"/>
           </a:p>
@@ -5578,7 +5586,7 @@
           </a:effectLst>
           <a:extLst>
             <a:ext uri="{91240B29-F687-4f45-9708-019B960494DF}">
-              <a14:hiddenLine xmlns="" xmlns:a14="http://schemas.microsoft.com/office/drawing/2010/main" w="9525">
+              <a14:hiddenLine xmlns:a14="http://schemas.microsoft.com/office/drawing/2010/main" xmlns="" w="9525">
                 <a:solidFill>
                   <a:srgbClr val="000000"/>
                 </a:solidFill>
@@ -5731,7 +5739,7 @@
             <a:pPr rtl="0"/>
             <a:fld id="{F5DCC735-4836-438E-94B4-052A67B7C164}" type="datetime1">
               <a:rPr lang="fr-FR" noProof="0" smtClean="0"/>
-              <a:t>08/10/2021</a:t>
+              <a:t>03/11/2021</a:t>
             </a:fld>
             <a:endParaRPr lang="fr-FR" noProof="0"/>
           </a:p>
@@ -5778,7 +5786,7 @@
             <a:pPr rtl="0"/>
             <a:fld id="{A4942799-31AF-4FF8-9D79-C1A3E01FB207}" type="slidenum">
               <a:rPr lang="fr-FR" noProof="0" smtClean="0"/>
-              <a:t>‹N°›</a:t>
+              <a:t>‹#›</a:t>
             </a:fld>
             <a:endParaRPr lang="fr-FR" noProof="0"/>
           </a:p>
@@ -6030,7 +6038,7 @@
             <a:pPr rtl="0"/>
             <a:fld id="{702FA6E0-C921-4D7E-B62B-EC7BFBAE24C9}" type="datetime1">
               <a:rPr lang="fr-FR" noProof="0" smtClean="0"/>
-              <a:t>08/10/2021</a:t>
+              <a:t>03/11/2021</a:t>
             </a:fld>
             <a:endParaRPr lang="fr-FR" noProof="0"/>
           </a:p>
@@ -6077,7 +6085,7 @@
             <a:pPr rtl="0"/>
             <a:fld id="{A4942799-31AF-4FF8-9D79-C1A3E01FB207}" type="slidenum">
               <a:rPr lang="fr-FR" noProof="0" smtClean="0"/>
-              <a:t>‹N°›</a:t>
+              <a:t>‹#›</a:t>
             </a:fld>
             <a:endParaRPr lang="fr-FR" noProof="0"/>
           </a:p>
@@ -6197,7 +6205,7 @@
           </a:effectLst>
           <a:extLst>
             <a:ext uri="{91240B29-F687-4f45-9708-019B960494DF}">
-              <a14:hiddenLine xmlns="" xmlns:a14="http://schemas.microsoft.com/office/drawing/2010/main" w="9525">
+              <a14:hiddenLine xmlns:a14="http://schemas.microsoft.com/office/drawing/2010/main" xmlns="" w="9525">
                 <a:solidFill>
                   <a:srgbClr val="000000"/>
                 </a:solidFill>
@@ -6354,7 +6362,7 @@
             <a:pPr rtl="0"/>
             <a:fld id="{87B74A97-18C2-432A-81AC-76BF6BC9B532}" type="datetime1">
               <a:rPr lang="fr-FR" noProof="0" smtClean="0"/>
-              <a:t>08/10/2021</a:t>
+              <a:t>03/11/2021</a:t>
             </a:fld>
             <a:endParaRPr lang="fr-FR" noProof="0"/>
           </a:p>
@@ -6401,7 +6409,7 @@
             <a:pPr rtl="0"/>
             <a:fld id="{A4942799-31AF-4FF8-9D79-C1A3E01FB207}" type="slidenum">
               <a:rPr lang="fr-FR" noProof="0" smtClean="0"/>
-              <a:t>‹N°›</a:t>
+              <a:t>‹#›</a:t>
             </a:fld>
             <a:endParaRPr lang="fr-FR" noProof="0"/>
           </a:p>
@@ -6601,7 +6609,7 @@
           </a:effectLst>
           <a:extLst>
             <a:ext uri="{91240B29-F687-4f45-9708-019B960494DF}">
-              <a14:hiddenLine xmlns="" xmlns:a14="http://schemas.microsoft.com/office/drawing/2010/main" w="9525">
+              <a14:hiddenLine xmlns:a14="http://schemas.microsoft.com/office/drawing/2010/main" xmlns="" w="9525">
                 <a:solidFill>
                   <a:srgbClr val="000000"/>
                 </a:solidFill>
@@ -6832,7 +6840,7 @@
             <a:pPr rtl="0"/>
             <a:fld id="{F8AD7DCA-FC5E-453D-B277-FD07E71F8824}" type="datetime1">
               <a:rPr lang="fr-FR" noProof="0" smtClean="0"/>
-              <a:t>08/10/2021</a:t>
+              <a:t>03/11/2021</a:t>
             </a:fld>
             <a:endParaRPr lang="fr-FR" noProof="0"/>
           </a:p>
@@ -6879,7 +6887,7 @@
             <a:pPr rtl="0"/>
             <a:fld id="{A4942799-31AF-4FF8-9D79-C1A3E01FB207}" type="slidenum">
               <a:rPr lang="fr-FR" noProof="0" smtClean="0"/>
-              <a:t>‹N°›</a:t>
+              <a:t>‹#›</a:t>
             </a:fld>
             <a:endParaRPr lang="fr-FR" noProof="0"/>
           </a:p>
@@ -7172,7 +7180,7 @@
             <a:pPr rtl="0"/>
             <a:fld id="{C682F63A-35CB-46AE-9C1D-159D6C6BF117}" type="datetime1">
               <a:rPr lang="fr-FR" noProof="0" smtClean="0"/>
-              <a:t>08/10/2021</a:t>
+              <a:t>03/11/2021</a:t>
             </a:fld>
             <a:endParaRPr lang="fr-FR" noProof="0"/>
           </a:p>
@@ -7229,7 +7237,7 @@
             <a:pPr rtl="0"/>
             <a:fld id="{A4942799-31AF-4FF8-9D79-C1A3E01FB207}" type="slidenum">
               <a:rPr lang="fr-FR" noProof="0" smtClean="0"/>
-              <a:t>‹N°›</a:t>
+              <a:t>‹#›</a:t>
             </a:fld>
             <a:endParaRPr lang="fr-FR" noProof="0"/>
           </a:p>
@@ -7422,7 +7430,7 @@
           </a:effectLst>
           <a:extLst>
             <a:ext uri="{91240B29-F687-4f45-9708-019B960494DF}">
-              <a14:hiddenLine xmlns="" xmlns:a14="http://schemas.microsoft.com/office/drawing/2010/main" w="9525">
+              <a14:hiddenLine xmlns:a14="http://schemas.microsoft.com/office/drawing/2010/main" xmlns="" w="9525">
                 <a:solidFill>
                   <a:srgbClr val="000000"/>
                 </a:solidFill>
@@ -7567,7 +7575,7 @@
             <a:pPr rtl="0"/>
             <a:fld id="{D0286CBF-0642-4926-8D76-3325A476758C}" type="datetime1">
               <a:rPr lang="fr-FR" noProof="0" smtClean="0"/>
-              <a:t>08/10/2021</a:t>
+              <a:t>03/11/2021</a:t>
             </a:fld>
             <a:endParaRPr lang="fr-FR" noProof="0"/>
           </a:p>
@@ -7614,7 +7622,7 @@
             <a:pPr rtl="0"/>
             <a:fld id="{A4942799-31AF-4FF8-9D79-C1A3E01FB207}" type="slidenum">
               <a:rPr lang="fr-FR" noProof="0" smtClean="0"/>
-              <a:t>‹N°›</a:t>
+              <a:t>‹#›</a:t>
             </a:fld>
             <a:endParaRPr lang="fr-FR" noProof="0"/>
           </a:p>
@@ -7710,7 +7718,7 @@
             <a:pPr rtl="0"/>
             <a:fld id="{7561D99F-DFC4-428F-AE99-ADA3CD032D36}" type="datetime1">
               <a:rPr lang="fr-FR" noProof="0" smtClean="0"/>
-              <a:t>08/10/2021</a:t>
+              <a:t>03/11/2021</a:t>
             </a:fld>
             <a:endParaRPr lang="fr-FR" noProof="0"/>
           </a:p>
@@ -7757,7 +7765,7 @@
             <a:pPr rtl="0"/>
             <a:fld id="{A4942799-31AF-4FF8-9D79-C1A3E01FB207}" type="slidenum">
               <a:rPr lang="fr-FR" noProof="0" smtClean="0"/>
-              <a:t>‹N°›</a:t>
+              <a:t>‹#›</a:t>
             </a:fld>
             <a:endParaRPr lang="fr-FR" noProof="0"/>
           </a:p>
@@ -8283,7 +8291,7 @@
           </a:effectLst>
           <a:extLst>
             <a:ext uri="{91240B29-F687-4f45-9708-019B960494DF}">
-              <a14:hiddenLine xmlns="" xmlns:a14="http://schemas.microsoft.com/office/drawing/2010/main" w="9525">
+              <a14:hiddenLine xmlns:a14="http://schemas.microsoft.com/office/drawing/2010/main" xmlns="" w="9525">
                 <a:solidFill>
                   <a:srgbClr val="000000"/>
                 </a:solidFill>
@@ -8415,7 +8423,7 @@
             <a:pPr rtl="0"/>
             <a:fld id="{3DF3897B-312A-440A-B21F-96636D9AADA9}" type="datetime1">
               <a:rPr lang="fr-FR" noProof="0" smtClean="0"/>
-              <a:t>08/10/2021</a:t>
+              <a:t>03/11/2021</a:t>
             </a:fld>
             <a:endParaRPr lang="fr-FR" noProof="0"/>
           </a:p>
@@ -8462,7 +8470,7 @@
             <a:pPr rtl="0"/>
             <a:fld id="{A4942799-31AF-4FF8-9D79-C1A3E01FB207}" type="slidenum">
               <a:rPr lang="fr-FR" noProof="0" smtClean="0"/>
-              <a:t>‹N°›</a:t>
+              <a:t>‹#›</a:t>
             </a:fld>
             <a:endParaRPr lang="fr-FR" noProof="0"/>
           </a:p>
@@ -8672,7 +8680,7 @@
             <a:pPr rtl="0"/>
             <a:fld id="{63D86642-8978-4E99-8117-E7C2E448BF50}" type="datetime1">
               <a:rPr lang="fr-FR" noProof="0" smtClean="0"/>
-              <a:t>08/10/2021</a:t>
+              <a:t>03/11/2021</a:t>
             </a:fld>
             <a:endParaRPr lang="fr-FR" noProof="0"/>
           </a:p>
@@ -8712,7 +8720,7 @@
             <a:pPr rtl="0"/>
             <a:fld id="{A4942799-31AF-4FF8-9D79-C1A3E01FB207}" type="slidenum">
               <a:rPr lang="fr-FR" noProof="0" smtClean="0"/>
-              <a:t>‹N°›</a:t>
+              <a:t>‹#›</a:t>
             </a:fld>
             <a:endParaRPr lang="fr-FR" noProof="0"/>
           </a:p>
@@ -9202,8 +9210,8 @@
           <a:p>
             <a:pPr rtl="0"/>
             <a:r>
-              <a:rPr lang="fr-FR" sz="2400" dirty="0" err="1"/>
-              <a:t>Inés</a:t>
+              <a:rPr lang="fr-FR" dirty="0"/>
+              <a:t>Ines</a:t>
             </a:r>
             <a:r>
               <a:rPr lang="fr-FR" sz="2400" dirty="0"/>
@@ -10471,12 +10479,8 @@
           <a:lstStyle/>
           <a:p>
             <a:r>
-              <a:rPr lang="en-US" dirty="0" err="1"/>
-              <a:t>Descision</a:t>
-            </a:r>
-            <a:r>
               <a:rPr lang="en-US" dirty="0"/>
-              <a:t> table</a:t>
+              <a:t>Decision table</a:t>
             </a:r>
           </a:p>
         </p:txBody>
@@ -11350,21 +11354,21 @@
 </file>
 
 <file path=customXml/item1.xml><?xml version="1.0" encoding="utf-8"?>
+<p:properties xmlns:p="http://schemas.microsoft.com/office/2006/metadata/properties" xmlns:xsi="http://www.w3.org/2001/XMLSchema-instance" xmlns:pc="http://schemas.microsoft.com/office/infopath/2007/PartnerControls">
+  <documentManagement>
+    <_ip_UnifiedCompliancePolicyUIAction xmlns="http://schemas.microsoft.com/sharepoint/v3" xsi:nil="true"/>
+    <_ip_UnifiedCompliancePolicyProperties xmlns="http://schemas.microsoft.com/sharepoint/v3" xsi:nil="true"/>
+  </documentManagement>
+</p:properties>
+</file>
+
+<file path=customXml/item2.xml><?xml version="1.0" encoding="utf-8"?>
 <?mso-contentType ?>
 <FormTemplates xmlns="http://schemas.microsoft.com/sharepoint/v3/contenttype/forms">
   <Display>DocumentLibraryForm</Display>
   <Edit>DocumentLibraryForm</Edit>
   <New>DocumentLibraryForm</New>
 </FormTemplates>
-</file>
-
-<file path=customXml/item2.xml><?xml version="1.0" encoding="utf-8"?>
-<p:properties xmlns:p="http://schemas.microsoft.com/office/2006/metadata/properties" xmlns:xsi="http://www.w3.org/2001/XMLSchema-instance" xmlns:pc="http://schemas.microsoft.com/office/infopath/2007/PartnerControls">
-  <documentManagement>
-    <_ip_UnifiedCompliancePolicyUIAction xmlns="http://schemas.microsoft.com/sharepoint/v3" xsi:nil="true"/>
-    <_ip_UnifiedCompliancePolicyProperties xmlns="http://schemas.microsoft.com/sharepoint/v3" xsi:nil="true"/>
-  </documentManagement>
-</p:properties>
 </file>
 
 <file path=customXml/item3.xml><?xml version="1.0" encoding="utf-8"?>
@@ -11576,19 +11580,19 @@
 </file>
 
 <file path=customXml/itemProps1.xml><?xml version="1.0" encoding="utf-8"?>
-<ds:datastoreItem xmlns:ds="http://schemas.openxmlformats.org/officeDocument/2006/customXml" ds:itemID="{0DC75368-59C6-47C9-94A5-81D396CCE5D1}">
+<ds:datastoreItem xmlns:ds="http://schemas.openxmlformats.org/officeDocument/2006/customXml" ds:itemID="{9A1DE3E1-BE43-4468-8986-14BA0CF36A3F}">
   <ds:schemaRefs>
-    <ds:schemaRef ds:uri="http://schemas.microsoft.com/sharepoint/v3/contenttype/forms"/>
+    <ds:schemaRef ds:uri="http://schemas.microsoft.com/office/2006/metadata/properties"/>
+    <ds:schemaRef ds:uri="http://schemas.microsoft.com/office/infopath/2007/PartnerControls"/>
+    <ds:schemaRef ds:uri="http://schemas.microsoft.com/sharepoint/v3"/>
   </ds:schemaRefs>
 </ds:datastoreItem>
 </file>
 
 <file path=customXml/itemProps2.xml><?xml version="1.0" encoding="utf-8"?>
-<ds:datastoreItem xmlns:ds="http://schemas.openxmlformats.org/officeDocument/2006/customXml" ds:itemID="{9A1DE3E1-BE43-4468-8986-14BA0CF36A3F}">
+<ds:datastoreItem xmlns:ds="http://schemas.openxmlformats.org/officeDocument/2006/customXml" ds:itemID="{0DC75368-59C6-47C9-94A5-81D396CCE5D1}">
   <ds:schemaRefs>
-    <ds:schemaRef ds:uri="http://schemas.microsoft.com/office/2006/metadata/properties"/>
-    <ds:schemaRef ds:uri="http://schemas.microsoft.com/office/infopath/2007/PartnerControls"/>
-    <ds:schemaRef ds:uri="http://schemas.microsoft.com/sharepoint/v3"/>
+    <ds:schemaRef ds:uri="http://schemas.microsoft.com/sharepoint/v3/contenttype/forms"/>
   </ds:schemaRefs>
 </ds:datastoreItem>
 </file>

</xml_diff>